<commit_message>
Atualização git: files unchanged
</commit_message>
<xml_diff>
--- a/ExecucoesGerais/ASGEO2_REAL2.pptx
+++ b/ExecucoesGerais/ASGEO2_REAL2.pptx
@@ -5,10 +5,10 @@
     <p:sldMasterId id="2147483648" r:id="rId1"/>
   </p:sldMasterIdLst>
   <p:notesMasterIdLst>
-    <p:notesMasterId r:id="rId19"/>
+    <p:notesMasterId r:id="rId21"/>
   </p:notesMasterIdLst>
   <p:handoutMasterIdLst>
-    <p:handoutMasterId r:id="rId20"/>
+    <p:handoutMasterId r:id="rId22"/>
   </p:handoutMasterIdLst>
   <p:sldIdLst>
     <p:sldId id="256" r:id="rId3"/>
@@ -27,6 +27,8 @@
     <p:sldId id="273" r:id="rId16"/>
     <p:sldId id="274" r:id="rId17"/>
     <p:sldId id="275" r:id="rId18"/>
+    <p:sldId id="276" r:id="rId19"/>
+    <p:sldId id="277" r:id="rId20"/>
   </p:sldIdLst>
   <p:sldSz cx="12192000" cy="6858000"/>
   <p:notesSz cx="7103745" cy="10234295"/>
@@ -7916,6 +7918,1450 @@
 </p:sld>
 </file>
 
+<file path=ppt/slides/slide17.xml><?xml version="1.0" encoding="utf-8"?>
+<p:sld xmlns:a="http://schemas.openxmlformats.org/drawingml/2006/main" xmlns:r="http://schemas.openxmlformats.org/officeDocument/2006/relationships" xmlns:p="http://schemas.openxmlformats.org/presentationml/2006/main">
+  <p:cSld>
+    <p:spTree>
+      <p:nvGrpSpPr>
+        <p:cNvPr id="1" name=""/>
+        <p:cNvGrpSpPr/>
+        <p:nvPr/>
+      </p:nvGrpSpPr>
+      <p:grpSpPr/>
+      <p:sp>
+        <p:nvSpPr>
+          <p:cNvPr id="4" name="Text Box 3"/>
+          <p:cNvSpPr txBox="1"/>
+          <p:nvPr/>
+        </p:nvSpPr>
+        <p:spPr>
+          <a:xfrm>
+            <a:off x="2932430" y="629285"/>
+            <a:ext cx="6004560" cy="583565"/>
+          </a:xfrm>
+          <a:prstGeom prst="rect">
+            <a:avLst/>
+          </a:prstGeom>
+          <a:noFill/>
+        </p:spPr>
+        <p:txBody>
+          <a:bodyPr wrap="square" rtlCol="0">
+            <a:spAutoFit/>
+          </a:bodyPr>
+          <a:p>
+            <a:pPr algn="ctr"/>
+            <a:r>
+              <a:rPr lang="pt-PT" altLang="en-US" sz="3200"/>
+              <a:t>Novas implemenações</a:t>
+            </a:r>
+            <a:endParaRPr lang="pt-PT" altLang="en-US" sz="3200"/>
+          </a:p>
+        </p:txBody>
+      </p:sp>
+      <p:sp>
+        <p:nvSpPr>
+          <p:cNvPr id="2" name="Text Box 1"/>
+          <p:cNvSpPr txBox="1"/>
+          <p:nvPr/>
+        </p:nvSpPr>
+        <p:spPr>
+          <a:xfrm>
+            <a:off x="2120265" y="3232785"/>
+            <a:ext cx="7627620" cy="1198880"/>
+          </a:xfrm>
+          <a:prstGeom prst="rect">
+            <a:avLst/>
+          </a:prstGeom>
+          <a:noFill/>
+        </p:spPr>
+        <p:txBody>
+          <a:bodyPr wrap="square" rtlCol="0">
+            <a:spAutoFit/>
+          </a:bodyPr>
+          <a:p>
+            <a:pPr indent="0" algn="ctr">
+              <a:lnSpc>
+                <a:spcPct val="150000"/>
+              </a:lnSpc>
+              <a:buFont typeface="Arial" panose="020B0604020202020204" pitchFamily="34" charset="0"/>
+              <a:buNone/>
+            </a:pPr>
+            <a:r>
+              <a:rPr lang="pt-PT" altLang="en-US" sz="2400"/>
+              <a:t>Organização de todos os melhores algoritmos já executados até o momento</a:t>
+            </a:r>
+            <a:endParaRPr lang="pt-PT" altLang="en-US" sz="2400"/>
+          </a:p>
+        </p:txBody>
+      </p:sp>
+      <p:cxnSp>
+        <p:nvCxnSpPr>
+          <p:cNvPr id="22" name="Straight Connector 21"/>
+          <p:cNvCxnSpPr/>
+          <p:nvPr/>
+        </p:nvCxnSpPr>
+        <p:spPr>
+          <a:xfrm>
+            <a:off x="2711450" y="1198880"/>
+            <a:ext cx="6445885" cy="13970"/>
+          </a:xfrm>
+          <a:prstGeom prst="line">
+            <a:avLst/>
+          </a:prstGeom>
+          <a:ln w="38100">
+            <a:solidFill>
+              <a:schemeClr val="accent2"/>
+            </a:solidFill>
+          </a:ln>
+        </p:spPr>
+        <p:style>
+          <a:lnRef idx="1">
+            <a:schemeClr val="accent1"/>
+          </a:lnRef>
+          <a:fillRef idx="0">
+            <a:schemeClr val="accent1"/>
+          </a:fillRef>
+          <a:effectRef idx="0">
+            <a:schemeClr val="accent1"/>
+          </a:effectRef>
+          <a:fontRef idx="minor">
+            <a:schemeClr val="tx1"/>
+          </a:fontRef>
+        </p:style>
+      </p:cxnSp>
+    </p:spTree>
+  </p:cSld>
+  <p:clrMapOvr>
+    <a:masterClrMapping/>
+  </p:clrMapOvr>
+</p:sld>
+</file>
+
+<file path=ppt/slides/slide18.xml><?xml version="1.0" encoding="utf-8"?>
+<p:sld xmlns:a="http://schemas.openxmlformats.org/drawingml/2006/main" xmlns:r="http://schemas.openxmlformats.org/officeDocument/2006/relationships" xmlns:p="http://schemas.openxmlformats.org/presentationml/2006/main">
+  <p:cSld>
+    <p:spTree>
+      <p:nvGrpSpPr>
+        <p:cNvPr id="1" name=""/>
+        <p:cNvGrpSpPr/>
+        <p:nvPr/>
+      </p:nvGrpSpPr>
+      <p:grpSpPr/>
+      <p:graphicFrame>
+        <p:nvGraphicFramePr>
+          <p:cNvPr id="6" name="Table 5"/>
+          <p:cNvGraphicFramePr/>
+          <p:nvPr/>
+        </p:nvGraphicFramePr>
+        <p:xfrm>
+          <a:off x="1800225" y="971550"/>
+          <a:ext cx="8592185" cy="5732145"/>
+        </p:xfrm>
+        <a:graphic>
+          <a:graphicData uri="http://schemas.openxmlformats.org/drawingml/2006/table">
+            <a:tbl>
+              <a:tblPr firstRow="1" bandRow="1">
+                <a:tableStyleId>{5C22544A-7EE6-4342-B048-85BDC9FD1C3A}</a:tableStyleId>
+              </a:tblPr>
+              <a:tblGrid>
+                <a:gridCol w="1748155"/>
+                <a:gridCol w="1732280"/>
+                <a:gridCol w="1767205"/>
+                <a:gridCol w="1627505"/>
+                <a:gridCol w="1717040"/>
+              </a:tblGrid>
+              <a:tr h="1368425">
+                <a:tc>
+                  <a:txBody>
+                    <a:bodyPr/>
+                    <a:p>
+                      <a:pPr indent="0" algn="ctr">
+                        <a:lnSpc>
+                          <a:spcPct val="100000"/>
+                        </a:lnSpc>
+                        <a:buNone/>
+                      </a:pPr>
+                      <a:r>
+                        <a:rPr lang="en-US" sz="1800" b="1">
+                          <a:solidFill>
+                            <a:srgbClr val="000000"/>
+                          </a:solidFill>
+                          <a:latin typeface="Calibri" charset="-122"/>
+                        </a:rPr>
+                        <a:t>AGEO2real1 igor</a:t>
+                      </a:r>
+                      <a:endParaRPr lang="en-US" sz="1800" b="1">
+                        <a:solidFill>
+                          <a:srgbClr val="000000"/>
+                        </a:solidFill>
+                        <a:latin typeface="Calibri" charset="-122"/>
+                      </a:endParaRPr>
+                    </a:p>
+                  </a:txBody>
+                  <a:tcPr marL="12700" marR="12700" marT="12700" vert="horz" anchor="ctr" anchorCtr="0">
+                    <a:lnL w="12700">
+                      <a:solidFill>
+                        <a:schemeClr val="tx1"/>
+                      </a:solidFill>
+                      <a:prstDash val="solid"/>
+                    </a:lnL>
+                    <a:lnR w="12700">
+                      <a:solidFill>
+                        <a:schemeClr val="tx1"/>
+                      </a:solidFill>
+                      <a:prstDash val="solid"/>
+                    </a:lnR>
+                    <a:lnT w="12700">
+                      <a:solidFill>
+                        <a:schemeClr val="tx1"/>
+                      </a:solidFill>
+                      <a:prstDash val="solid"/>
+                    </a:lnT>
+                    <a:lnB w="12700">
+                      <a:solidFill>
+                        <a:schemeClr val="tx1"/>
+                      </a:solidFill>
+                      <a:prstDash val="solid"/>
+                    </a:lnB>
+                    <a:lnTlToBr>
+                      <a:noFill/>
+                    </a:lnTlToBr>
+                    <a:lnBlToTr>
+                      <a:noFill/>
+                    </a:lnBlToTr>
+                    <a:noFill/>
+                  </a:tcPr>
+                </a:tc>
+                <a:tc>
+                  <a:txBody>
+                    <a:bodyPr/>
+                    <a:p>
+                      <a:pPr indent="0" algn="ctr">
+                        <a:lnSpc>
+                          <a:spcPct val="100000"/>
+                        </a:lnSpc>
+                        <a:buNone/>
+                      </a:pPr>
+                      <a:r>
+                        <a:rPr lang="en-US" sz="1800" b="1">
+                          <a:solidFill>
+                            <a:srgbClr val="000000"/>
+                          </a:solidFill>
+                          <a:latin typeface="Calibri" charset="-122"/>
+                        </a:rPr>
+                        <a:t>AGEO2real1 porcentagem</a:t>
+                      </a:r>
+                      <a:endParaRPr lang="en-US" sz="1800" b="1">
+                        <a:solidFill>
+                          <a:srgbClr val="000000"/>
+                        </a:solidFill>
+                        <a:latin typeface="Calibri" charset="-122"/>
+                      </a:endParaRPr>
+                    </a:p>
+                  </a:txBody>
+                  <a:tcPr marL="12700" marR="12700" marT="12700" vert="horz" anchor="ctr" anchorCtr="0">
+                    <a:lnL w="12700">
+                      <a:solidFill>
+                        <a:schemeClr val="tx1"/>
+                      </a:solidFill>
+                      <a:prstDash val="solid"/>
+                    </a:lnL>
+                    <a:lnR w="12700">
+                      <a:solidFill>
+                        <a:schemeClr val="tx1"/>
+                      </a:solidFill>
+                      <a:prstDash val="solid"/>
+                    </a:lnR>
+                    <a:lnT w="12700" cap="flat">
+                      <a:solidFill>
+                        <a:schemeClr val="tx1"/>
+                      </a:solidFill>
+                      <a:prstDash val="solid"/>
+                    </a:lnT>
+                    <a:lnB w="12700" cap="flat">
+                      <a:solidFill>
+                        <a:schemeClr val="tx1"/>
+                      </a:solidFill>
+                      <a:prstDash val="solid"/>
+                    </a:lnB>
+                    <a:lnTlToBr>
+                      <a:noFill/>
+                    </a:lnTlToBr>
+                    <a:lnBlToTr>
+                      <a:noFill/>
+                    </a:lnBlToTr>
+                    <a:noFill/>
+                  </a:tcPr>
+                </a:tc>
+                <a:tc>
+                  <a:txBody>
+                    <a:bodyPr/>
+                    <a:p>
+                      <a:pPr indent="0" algn="ctr">
+                        <a:lnSpc>
+                          <a:spcPct val="100000"/>
+                        </a:lnSpc>
+                        <a:buNone/>
+                      </a:pPr>
+                      <a:r>
+                        <a:rPr lang="en-US" sz="1800" b="1">
+                          <a:solidFill>
+                            <a:srgbClr val="000000"/>
+                          </a:solidFill>
+                          <a:latin typeface="Calibri" charset="-122"/>
+                        </a:rPr>
+                        <a:t>AGEO2real2 igor</a:t>
+                      </a:r>
+                      <a:endParaRPr lang="en-US" sz="1800" b="1">
+                        <a:solidFill>
+                          <a:srgbClr val="000000"/>
+                        </a:solidFill>
+                        <a:latin typeface="Calibri" charset="-122"/>
+                      </a:endParaRPr>
+                    </a:p>
+                  </a:txBody>
+                  <a:tcPr marL="12700" marR="12700" marT="12700" vert="horz" anchor="ctr" anchorCtr="0">
+                    <a:lnL w="12700">
+                      <a:solidFill>
+                        <a:schemeClr val="tx1"/>
+                      </a:solidFill>
+                      <a:prstDash val="solid"/>
+                    </a:lnL>
+                    <a:lnR w="12700">
+                      <a:solidFill>
+                        <a:schemeClr val="tx1"/>
+                      </a:solidFill>
+                      <a:prstDash val="solid"/>
+                    </a:lnR>
+                    <a:lnT w="12700" cap="flat">
+                      <a:solidFill>
+                        <a:schemeClr val="tx1"/>
+                      </a:solidFill>
+                      <a:prstDash val="solid"/>
+                    </a:lnT>
+                    <a:lnB w="12700" cap="flat">
+                      <a:solidFill>
+                        <a:schemeClr val="tx1"/>
+                      </a:solidFill>
+                      <a:prstDash val="solid"/>
+                    </a:lnB>
+                    <a:lnTlToBr>
+                      <a:noFill/>
+                    </a:lnTlToBr>
+                    <a:lnBlToTr>
+                      <a:noFill/>
+                    </a:lnBlToTr>
+                    <a:noFill/>
+                  </a:tcPr>
+                </a:tc>
+                <a:tc>
+                  <a:txBody>
+                    <a:bodyPr/>
+                    <a:p>
+                      <a:pPr indent="0" algn="ctr">
+                        <a:lnSpc>
+                          <a:spcPct val="100000"/>
+                        </a:lnSpc>
+                        <a:buNone/>
+                      </a:pPr>
+                      <a:r>
+                        <a:rPr lang="en-US" sz="1800" b="1">
+                          <a:solidFill>
+                            <a:srgbClr val="000000"/>
+                          </a:solidFill>
+                          <a:latin typeface="Calibri" charset="-122"/>
+                        </a:rPr>
+                        <a:t>AGEO2real2 porcentagem</a:t>
+                      </a:r>
+                      <a:endParaRPr lang="en-US" sz="1800" b="1">
+                        <a:solidFill>
+                          <a:srgbClr val="000000"/>
+                        </a:solidFill>
+                        <a:latin typeface="Calibri" charset="-122"/>
+                      </a:endParaRPr>
+                    </a:p>
+                  </a:txBody>
+                  <a:tcPr marL="12700" marR="12700" marT="12700" vert="horz" anchor="ctr" anchorCtr="0">
+                    <a:lnL w="12700">
+                      <a:solidFill>
+                        <a:schemeClr val="tx1"/>
+                      </a:solidFill>
+                      <a:prstDash val="solid"/>
+                    </a:lnL>
+                    <a:lnR w="12700">
+                      <a:solidFill>
+                        <a:schemeClr val="tx1"/>
+                      </a:solidFill>
+                      <a:prstDash val="solid"/>
+                    </a:lnR>
+                    <a:lnT w="12700" cap="flat">
+                      <a:solidFill>
+                        <a:schemeClr val="tx1"/>
+                      </a:solidFill>
+                      <a:prstDash val="solid"/>
+                    </a:lnT>
+                    <a:lnB w="12700" cap="flat">
+                      <a:solidFill>
+                        <a:schemeClr val="tx1"/>
+                      </a:solidFill>
+                      <a:prstDash val="solid"/>
+                    </a:lnB>
+                    <a:lnTlToBr>
+                      <a:noFill/>
+                    </a:lnTlToBr>
+                    <a:lnBlToTr>
+                      <a:noFill/>
+                    </a:lnBlToTr>
+                    <a:noFill/>
+                  </a:tcPr>
+                </a:tc>
+                <a:tc>
+                  <a:txBody>
+                    <a:bodyPr/>
+                    <a:p>
+                      <a:pPr indent="0" algn="ctr">
+                        <a:lnSpc>
+                          <a:spcPct val="100000"/>
+                        </a:lnSpc>
+                        <a:buNone/>
+                      </a:pPr>
+                      <a:r>
+                        <a:rPr lang="en-US" sz="1800" b="1">
+                          <a:solidFill>
+                            <a:srgbClr val="000000"/>
+                          </a:solidFill>
+                          <a:latin typeface="Calibri" charset="-122"/>
+                        </a:rPr>
+                        <a:t>AGEO2real2 normal</a:t>
+                      </a:r>
+                      <a:endParaRPr lang="en-US" sz="1800" b="1">
+                        <a:solidFill>
+                          <a:srgbClr val="000000"/>
+                        </a:solidFill>
+                        <a:latin typeface="Calibri" charset="-122"/>
+                      </a:endParaRPr>
+                    </a:p>
+                  </a:txBody>
+                  <a:tcPr marL="12700" marR="12700" marT="12700" vert="horz" anchor="ctr" anchorCtr="0">
+                    <a:lnL w="12700">
+                      <a:solidFill>
+                        <a:schemeClr val="tx1"/>
+                      </a:solidFill>
+                      <a:prstDash val="solid"/>
+                    </a:lnL>
+                    <a:lnR w="12700" cap="flat">
+                      <a:solidFill>
+                        <a:schemeClr val="tx1"/>
+                      </a:solidFill>
+                      <a:prstDash val="solid"/>
+                    </a:lnR>
+                    <a:lnT w="12700" cap="flat">
+                      <a:solidFill>
+                        <a:schemeClr val="tx1"/>
+                      </a:solidFill>
+                      <a:prstDash val="solid"/>
+                    </a:lnT>
+                    <a:lnB w="12700" cap="flat">
+                      <a:solidFill>
+                        <a:schemeClr val="tx1"/>
+                      </a:solidFill>
+                      <a:prstDash val="solid"/>
+                    </a:lnB>
+                    <a:lnTlToBr>
+                      <a:noFill/>
+                    </a:lnTlToBr>
+                    <a:lnBlToTr>
+                      <a:noFill/>
+                    </a:lnBlToTr>
+                    <a:noFill/>
+                  </a:tcPr>
+                </a:tc>
+              </a:tr>
+              <a:tr h="1628140">
+                <a:tc>
+                  <a:txBody>
+                    <a:bodyPr/>
+                    <a:p>
+                      <a:pPr indent="0" algn="ctr">
+                        <a:lnSpc>
+                          <a:spcPct val="100000"/>
+                        </a:lnSpc>
+                        <a:buNone/>
+                      </a:pPr>
+                      <a:r>
+                        <a:rPr lang="en-US" sz="1800" b="0">
+                          <a:solidFill>
+                            <a:srgbClr val="000000"/>
+                          </a:solidFill>
+                          <a:latin typeface="Calibri" charset="-122"/>
+                        </a:rPr>
+                        <a:t>Aceita uma só perturbação da população inteira</a:t>
+                      </a:r>
+                      <a:endParaRPr lang="en-US" sz="1800" b="0">
+                        <a:solidFill>
+                          <a:srgbClr val="000000"/>
+                        </a:solidFill>
+                        <a:latin typeface="Calibri" charset="-122"/>
+                      </a:endParaRPr>
+                    </a:p>
+                  </a:txBody>
+                  <a:tcPr marL="12700" marR="12700" marT="12700" vert="horz" anchor="ctr" anchorCtr="0">
+                    <a:lnL w="12700">
+                      <a:solidFill>
+                        <a:schemeClr val="tx1"/>
+                      </a:solidFill>
+                      <a:prstDash val="solid"/>
+                    </a:lnL>
+                    <a:lnR w="12700">
+                      <a:solidFill>
+                        <a:schemeClr val="tx1"/>
+                      </a:solidFill>
+                      <a:prstDash val="solid"/>
+                    </a:lnR>
+                    <a:lnT w="12700">
+                      <a:solidFill>
+                        <a:schemeClr val="tx1"/>
+                      </a:solidFill>
+                      <a:prstDash val="solid"/>
+                    </a:lnT>
+                    <a:lnB>
+                      <a:noFill/>
+                    </a:lnB>
+                    <a:lnTlToBr>
+                      <a:noFill/>
+                    </a:lnTlToBr>
+                    <a:lnBlToTr>
+                      <a:noFill/>
+                    </a:lnBlToTr>
+                    <a:noFill/>
+                  </a:tcPr>
+                </a:tc>
+                <a:tc>
+                  <a:txBody>
+                    <a:bodyPr/>
+                    <a:p>
+                      <a:pPr indent="0" algn="ctr">
+                        <a:lnSpc>
+                          <a:spcPct val="100000"/>
+                        </a:lnSpc>
+                        <a:buNone/>
+                      </a:pPr>
+                      <a:r>
+                        <a:rPr lang="en-US" sz="1800" b="0">
+                          <a:solidFill>
+                            <a:srgbClr val="000000"/>
+                          </a:solidFill>
+                          <a:latin typeface="Calibri" charset="-122"/>
+                        </a:rPr>
+                        <a:t>Aceita uma só perturbação da população inteira</a:t>
+                      </a:r>
+                      <a:endParaRPr lang="en-US" sz="1800" b="0">
+                        <a:solidFill>
+                          <a:srgbClr val="000000"/>
+                        </a:solidFill>
+                        <a:latin typeface="Calibri" charset="-122"/>
+                      </a:endParaRPr>
+                    </a:p>
+                  </a:txBody>
+                  <a:tcPr marL="12700" marR="12700" marT="12700" vert="horz" anchor="ctr" anchorCtr="0">
+                    <a:lnL w="12700">
+                      <a:solidFill>
+                        <a:schemeClr val="tx1"/>
+                      </a:solidFill>
+                      <a:prstDash val="solid"/>
+                    </a:lnL>
+                    <a:lnR w="12700">
+                      <a:solidFill>
+                        <a:schemeClr val="tx1"/>
+                      </a:solidFill>
+                      <a:prstDash val="solid"/>
+                    </a:lnR>
+                    <a:lnT w="12700" cap="flat">
+                      <a:solidFill>
+                        <a:schemeClr val="tx1"/>
+                      </a:solidFill>
+                      <a:prstDash val="solid"/>
+                    </a:lnT>
+                    <a:lnB cap="flat">
+                      <a:noFill/>
+                    </a:lnB>
+                    <a:lnTlToBr>
+                      <a:noFill/>
+                    </a:lnTlToBr>
+                    <a:lnBlToTr>
+                      <a:noFill/>
+                    </a:lnBlToTr>
+                    <a:noFill/>
+                  </a:tcPr>
+                </a:tc>
+                <a:tc>
+                  <a:txBody>
+                    <a:bodyPr/>
+                    <a:p>
+                      <a:pPr indent="0" algn="ctr">
+                        <a:lnSpc>
+                          <a:spcPct val="100000"/>
+                        </a:lnSpc>
+                        <a:buNone/>
+                      </a:pPr>
+                      <a:r>
+                        <a:rPr lang="en-US" sz="1800" b="0">
+                          <a:solidFill>
+                            <a:srgbClr val="000000"/>
+                          </a:solidFill>
+                          <a:latin typeface="Calibri" charset="-122"/>
+                        </a:rPr>
+                        <a:t>Aceita P perturbações (1 por variável)</a:t>
+                      </a:r>
+                      <a:endParaRPr lang="en-US" sz="1800" b="0">
+                        <a:solidFill>
+                          <a:srgbClr val="000000"/>
+                        </a:solidFill>
+                        <a:latin typeface="Calibri" charset="-122"/>
+                      </a:endParaRPr>
+                    </a:p>
+                  </a:txBody>
+                  <a:tcPr marL="12700" marR="12700" marT="12700" vert="horz" anchor="ctr" anchorCtr="0">
+                    <a:lnL w="12700">
+                      <a:solidFill>
+                        <a:schemeClr val="tx1"/>
+                      </a:solidFill>
+                      <a:prstDash val="solid"/>
+                    </a:lnL>
+                    <a:lnR w="12700">
+                      <a:solidFill>
+                        <a:schemeClr val="tx1"/>
+                      </a:solidFill>
+                      <a:prstDash val="solid"/>
+                    </a:lnR>
+                    <a:lnT w="12700" cap="flat">
+                      <a:solidFill>
+                        <a:schemeClr val="tx1"/>
+                      </a:solidFill>
+                      <a:prstDash val="solid"/>
+                    </a:lnT>
+                    <a:lnB cap="flat">
+                      <a:noFill/>
+                    </a:lnB>
+                    <a:lnTlToBr>
+                      <a:noFill/>
+                    </a:lnTlToBr>
+                    <a:lnBlToTr>
+                      <a:noFill/>
+                    </a:lnBlToTr>
+                    <a:noFill/>
+                  </a:tcPr>
+                </a:tc>
+                <a:tc>
+                  <a:txBody>
+                    <a:bodyPr/>
+                    <a:p>
+                      <a:pPr indent="0" algn="ctr">
+                        <a:lnSpc>
+                          <a:spcPct val="100000"/>
+                        </a:lnSpc>
+                        <a:buNone/>
+                      </a:pPr>
+                      <a:r>
+                        <a:rPr lang="en-US" sz="1800" b="0">
+                          <a:solidFill>
+                            <a:srgbClr val="000000"/>
+                          </a:solidFill>
+                          <a:latin typeface="Calibri" charset="-122"/>
+                        </a:rPr>
+                        <a:t>Aceita P perturbações (1 por variável)</a:t>
+                      </a:r>
+                      <a:endParaRPr lang="en-US" sz="1800" b="0">
+                        <a:solidFill>
+                          <a:srgbClr val="000000"/>
+                        </a:solidFill>
+                        <a:latin typeface="Calibri" charset="-122"/>
+                      </a:endParaRPr>
+                    </a:p>
+                  </a:txBody>
+                  <a:tcPr marL="12700" marR="12700" marT="12700" vert="horz" anchor="ctr" anchorCtr="0">
+                    <a:lnL w="12700">
+                      <a:solidFill>
+                        <a:schemeClr val="tx1"/>
+                      </a:solidFill>
+                      <a:prstDash val="solid"/>
+                    </a:lnL>
+                    <a:lnR w="12700">
+                      <a:solidFill>
+                        <a:schemeClr val="tx1"/>
+                      </a:solidFill>
+                      <a:prstDash val="solid"/>
+                    </a:lnR>
+                    <a:lnT w="12700" cap="flat">
+                      <a:solidFill>
+                        <a:schemeClr val="tx1"/>
+                      </a:solidFill>
+                      <a:prstDash val="solid"/>
+                    </a:lnT>
+                    <a:lnB cap="flat">
+                      <a:noFill/>
+                    </a:lnB>
+                    <a:lnTlToBr>
+                      <a:noFill/>
+                    </a:lnTlToBr>
+                    <a:lnBlToTr>
+                      <a:noFill/>
+                    </a:lnBlToTr>
+                    <a:noFill/>
+                  </a:tcPr>
+                </a:tc>
+                <a:tc>
+                  <a:txBody>
+                    <a:bodyPr/>
+                    <a:p>
+                      <a:pPr indent="0" algn="ctr">
+                        <a:lnSpc>
+                          <a:spcPct val="100000"/>
+                        </a:lnSpc>
+                        <a:buNone/>
+                      </a:pPr>
+                      <a:r>
+                        <a:rPr lang="en-US" sz="1800" b="0">
+                          <a:solidFill>
+                            <a:srgbClr val="000000"/>
+                          </a:solidFill>
+                          <a:latin typeface="Calibri" charset="-122"/>
+                        </a:rPr>
+                        <a:t>Aceita P perturbações (1 por variável)</a:t>
+                      </a:r>
+                      <a:endParaRPr lang="en-US" sz="1800" b="0">
+                        <a:solidFill>
+                          <a:srgbClr val="000000"/>
+                        </a:solidFill>
+                        <a:latin typeface="Calibri" charset="-122"/>
+                      </a:endParaRPr>
+                    </a:p>
+                  </a:txBody>
+                  <a:tcPr marL="12700" marR="12700" marT="12700" vert="horz" anchor="ctr" anchorCtr="0">
+                    <a:lnL w="12700">
+                      <a:solidFill>
+                        <a:schemeClr val="tx1"/>
+                      </a:solidFill>
+                      <a:prstDash val="solid"/>
+                    </a:lnL>
+                    <a:lnR w="12700" cap="flat">
+                      <a:solidFill>
+                        <a:schemeClr val="tx1"/>
+                      </a:solidFill>
+                      <a:prstDash val="solid"/>
+                    </a:lnR>
+                    <a:lnT w="12700" cap="flat">
+                      <a:solidFill>
+                        <a:schemeClr val="tx1"/>
+                      </a:solidFill>
+                      <a:prstDash val="solid"/>
+                    </a:lnT>
+                    <a:lnB cap="flat">
+                      <a:noFill/>
+                    </a:lnB>
+                    <a:lnTlToBr>
+                      <a:noFill/>
+                    </a:lnTlToBr>
+                    <a:lnBlToTr>
+                      <a:noFill/>
+                    </a:lnBlToTr>
+                    <a:noFill/>
+                  </a:tcPr>
+                </a:tc>
+              </a:tr>
+              <a:tr h="1628775">
+                <a:tc>
+                  <a:txBody>
+                    <a:bodyPr/>
+                    <a:p>
+                      <a:pPr indent="0" algn="ctr">
+                        <a:lnSpc>
+                          <a:spcPct val="100000"/>
+                        </a:lnSpc>
+                        <a:buNone/>
+                      </a:pPr>
+                      <a:r>
+                        <a:rPr lang="pt-PT" altLang="en-US" sz="1800" b="0">
+                          <a:solidFill>
+                            <a:srgbClr val="000000"/>
+                          </a:solidFill>
+                          <a:latin typeface="Calibri" charset="-122"/>
+                        </a:rPr>
+                        <a:t>tuning de std</a:t>
+                      </a:r>
+                      <a:endParaRPr lang="pt-PT" altLang="en-US" sz="1800" b="0">
+                        <a:solidFill>
+                          <a:srgbClr val="000000"/>
+                        </a:solidFill>
+                        <a:latin typeface="Calibri" charset="-122"/>
+                      </a:endParaRPr>
+                    </a:p>
+                  </a:txBody>
+                  <a:tcPr marL="12700" marR="12700" marT="12700" vert="horz" anchor="ctr" anchorCtr="0">
+                    <a:lnL w="12700">
+                      <a:solidFill>
+                        <a:schemeClr val="tx1"/>
+                      </a:solidFill>
+                      <a:prstDash val="solid"/>
+                    </a:lnL>
+                    <a:lnR w="12700">
+                      <a:solidFill>
+                        <a:schemeClr val="tx1"/>
+                      </a:solidFill>
+                      <a:prstDash val="solid"/>
+                    </a:lnR>
+                    <a:lnT>
+                      <a:noFill/>
+                    </a:lnT>
+                    <a:lnB>
+                      <a:noFill/>
+                    </a:lnB>
+                    <a:lnTlToBr>
+                      <a:noFill/>
+                    </a:lnTlToBr>
+                    <a:lnBlToTr>
+                      <a:noFill/>
+                    </a:lnBlToTr>
+                    <a:noFill/>
+                  </a:tcPr>
+                </a:tc>
+                <a:tc>
+                  <a:txBody>
+                    <a:bodyPr/>
+                    <a:p>
+                      <a:pPr indent="0" algn="ctr">
+                        <a:lnSpc>
+                          <a:spcPct val="100000"/>
+                        </a:lnSpc>
+                        <a:buNone/>
+                      </a:pPr>
+                      <a:r>
+                        <a:rPr lang="pt-PT" altLang="en-US" sz="1800"/>
+                        <a:t>tuning de p</a:t>
+                      </a:r>
+                      <a:endParaRPr lang="pt-PT" altLang="en-US" sz="1800"/>
+                    </a:p>
+                  </a:txBody>
+                  <a:tcPr marL="12700" marR="12700" marT="12700" vert="horz" anchor="ctr" anchorCtr="0">
+                    <a:lnL w="12700">
+                      <a:solidFill>
+                        <a:schemeClr val="tx1"/>
+                      </a:solidFill>
+                      <a:prstDash val="solid"/>
+                    </a:lnL>
+                    <a:lnR w="12700">
+                      <a:solidFill>
+                        <a:schemeClr val="tx1"/>
+                      </a:solidFill>
+                      <a:prstDash val="solid"/>
+                    </a:lnR>
+                    <a:lnT cap="flat">
+                      <a:noFill/>
+                    </a:lnT>
+                    <a:lnB cap="flat">
+                      <a:noFill/>
+                    </a:lnB>
+                    <a:lnTlToBr>
+                      <a:noFill/>
+                    </a:lnTlToBr>
+                    <a:lnBlToTr>
+                      <a:noFill/>
+                    </a:lnBlToTr>
+                    <a:noFill/>
+                  </a:tcPr>
+                </a:tc>
+                <a:tc>
+                  <a:txBody>
+                    <a:bodyPr/>
+                    <a:p>
+                      <a:pPr indent="0" algn="ctr">
+                        <a:lnSpc>
+                          <a:spcPct val="100000"/>
+                        </a:lnSpc>
+                        <a:buNone/>
+                      </a:pPr>
+                      <a:r>
+                        <a:rPr lang="en-US" sz="1800" b="0">
+                          <a:solidFill>
+                            <a:srgbClr val="000000"/>
+                          </a:solidFill>
+                          <a:latin typeface="Calibri" charset="-122"/>
+                        </a:rPr>
+                        <a:t>1 das perturbações é uniforme entre os limites</a:t>
+                      </a:r>
+                      <a:endParaRPr lang="en-US" sz="1800" b="0">
+                        <a:solidFill>
+                          <a:srgbClr val="000000"/>
+                        </a:solidFill>
+                        <a:latin typeface="Calibri" charset="-122"/>
+                      </a:endParaRPr>
+                    </a:p>
+                  </a:txBody>
+                  <a:tcPr marL="12700" marR="12700" marT="12700" vert="horz" anchor="ctr" anchorCtr="0">
+                    <a:lnL w="12700">
+                      <a:solidFill>
+                        <a:schemeClr val="tx1"/>
+                      </a:solidFill>
+                      <a:prstDash val="solid"/>
+                    </a:lnL>
+                    <a:lnR w="12700">
+                      <a:solidFill>
+                        <a:schemeClr val="tx1"/>
+                      </a:solidFill>
+                      <a:prstDash val="solid"/>
+                    </a:lnR>
+                    <a:lnT cap="flat">
+                      <a:noFill/>
+                    </a:lnT>
+                    <a:lnB cap="flat">
+                      <a:noFill/>
+                    </a:lnB>
+                    <a:lnTlToBr>
+                      <a:noFill/>
+                    </a:lnTlToBr>
+                    <a:lnBlToTr>
+                      <a:noFill/>
+                    </a:lnBlToTr>
+                    <a:noFill/>
+                  </a:tcPr>
+                </a:tc>
+                <a:tc>
+                  <a:txBody>
+                    <a:bodyPr/>
+                    <a:p>
+                      <a:pPr indent="0" algn="ctr">
+                        <a:lnSpc>
+                          <a:spcPct val="100000"/>
+                        </a:lnSpc>
+                        <a:buNone/>
+                      </a:pPr>
+                      <a:r>
+                        <a:rPr lang="en-US" sz="1800" b="0">
+                          <a:solidFill>
+                            <a:srgbClr val="000000"/>
+                          </a:solidFill>
+                          <a:latin typeface="Calibri" charset="-122"/>
+                        </a:rPr>
+                        <a:t>1 das perturbações é uniforme entre os limites</a:t>
+                      </a:r>
+                      <a:endParaRPr lang="en-US" sz="1800" b="0">
+                        <a:solidFill>
+                          <a:srgbClr val="000000"/>
+                        </a:solidFill>
+                        <a:latin typeface="Calibri" charset="-122"/>
+                      </a:endParaRPr>
+                    </a:p>
+                  </a:txBody>
+                  <a:tcPr marL="12700" marR="12700" marT="12700" vert="horz" anchor="ctr" anchorCtr="0">
+                    <a:lnL w="12700">
+                      <a:solidFill>
+                        <a:schemeClr val="tx1"/>
+                      </a:solidFill>
+                      <a:prstDash val="solid"/>
+                    </a:lnL>
+                    <a:lnR w="12700">
+                      <a:solidFill>
+                        <a:schemeClr val="tx1"/>
+                      </a:solidFill>
+                      <a:prstDash val="solid"/>
+                    </a:lnR>
+                    <a:lnT cap="flat">
+                      <a:noFill/>
+                    </a:lnT>
+                    <a:lnB cap="flat">
+                      <a:noFill/>
+                    </a:lnB>
+                    <a:lnTlToBr>
+                      <a:noFill/>
+                    </a:lnTlToBr>
+                    <a:lnBlToTr>
+                      <a:noFill/>
+                    </a:lnBlToTr>
+                    <a:noFill/>
+                  </a:tcPr>
+                </a:tc>
+                <a:tc>
+                  <a:txBody>
+                    <a:bodyPr/>
+                    <a:p>
+                      <a:pPr indent="0" algn="ctr">
+                        <a:lnSpc>
+                          <a:spcPct val="100000"/>
+                        </a:lnSpc>
+                        <a:buNone/>
+                      </a:pPr>
+                      <a:r>
+                        <a:rPr lang="en-US" sz="1800" b="0">
+                          <a:solidFill>
+                            <a:srgbClr val="000000"/>
+                          </a:solidFill>
+                          <a:latin typeface="Calibri" charset="-122"/>
+                        </a:rPr>
+                        <a:t>1 das perturbações é uniforme entre os limites</a:t>
+                      </a:r>
+                      <a:endParaRPr lang="en-US" sz="1800" b="0">
+                        <a:solidFill>
+                          <a:srgbClr val="000000"/>
+                        </a:solidFill>
+                        <a:latin typeface="Calibri" charset="-122"/>
+                      </a:endParaRPr>
+                    </a:p>
+                  </a:txBody>
+                  <a:tcPr marL="12700" marR="12700" marT="12700" vert="horz" anchor="ctr" anchorCtr="0">
+                    <a:lnL w="12700">
+                      <a:solidFill>
+                        <a:schemeClr val="tx1"/>
+                      </a:solidFill>
+                      <a:prstDash val="solid"/>
+                    </a:lnL>
+                    <a:lnR w="12700" cap="flat">
+                      <a:solidFill>
+                        <a:schemeClr val="tx1"/>
+                      </a:solidFill>
+                      <a:prstDash val="solid"/>
+                    </a:lnR>
+                    <a:lnT cap="flat">
+                      <a:noFill/>
+                    </a:lnT>
+                    <a:lnB cap="flat">
+                      <a:noFill/>
+                    </a:lnB>
+                    <a:lnTlToBr>
+                      <a:noFill/>
+                    </a:lnTlToBr>
+                    <a:lnBlToTr>
+                      <a:noFill/>
+                    </a:lnBlToTr>
+                    <a:noFill/>
+                  </a:tcPr>
+                </a:tc>
+              </a:tr>
+              <a:tr h="1106805">
+                <a:tc>
+                  <a:txBody>
+                    <a:bodyPr/>
+                    <a:p>
+                      <a:pPr indent="0" algn="ctr">
+                        <a:lnSpc>
+                          <a:spcPct val="100000"/>
+                        </a:lnSpc>
+                        <a:buNone/>
+                      </a:pPr>
+                      <a:endParaRPr lang="en-US" sz="1800" b="0">
+                        <a:solidFill>
+                          <a:srgbClr val="000000"/>
+                        </a:solidFill>
+                        <a:latin typeface="Calibri" charset="-122"/>
+                      </a:endParaRPr>
+                    </a:p>
+                  </a:txBody>
+                  <a:tcPr marL="12700" marR="12700" marT="12700" vert="horz" anchor="ctr" anchorCtr="0">
+                    <a:lnL w="12700">
+                      <a:solidFill>
+                        <a:schemeClr val="tx1"/>
+                      </a:solidFill>
+                      <a:prstDash val="solid"/>
+                    </a:lnL>
+                    <a:lnR w="12700">
+                      <a:solidFill>
+                        <a:schemeClr val="tx1"/>
+                      </a:solidFill>
+                      <a:prstDash val="solid"/>
+                    </a:lnR>
+                    <a:lnT>
+                      <a:noFill/>
+                    </a:lnT>
+                    <a:lnB w="12700">
+                      <a:solidFill>
+                        <a:schemeClr val="tx1"/>
+                      </a:solidFill>
+                      <a:prstDash val="solid"/>
+                    </a:lnB>
+                    <a:lnTlToBr>
+                      <a:noFill/>
+                    </a:lnTlToBr>
+                    <a:lnBlToTr>
+                      <a:noFill/>
+                    </a:lnBlToTr>
+                    <a:noFill/>
+                  </a:tcPr>
+                </a:tc>
+                <a:tc>
+                  <a:txBody>
+                    <a:bodyPr/>
+                    <a:p>
+                      <a:pPr indent="0" algn="ctr">
+                        <a:lnSpc>
+                          <a:spcPct val="100000"/>
+                        </a:lnSpc>
+                        <a:buNone/>
+                      </a:pPr>
+                      <a:endParaRPr lang="en-US" sz="1800"/>
+                    </a:p>
+                  </a:txBody>
+                  <a:tcPr marL="12700" marR="12700" marT="12700" vert="horz" anchor="ctr" anchorCtr="0">
+                    <a:lnL w="12700">
+                      <a:solidFill>
+                        <a:schemeClr val="tx1"/>
+                      </a:solidFill>
+                      <a:prstDash val="solid"/>
+                    </a:lnL>
+                    <a:lnR w="12700">
+                      <a:solidFill>
+                        <a:schemeClr val="tx1"/>
+                      </a:solidFill>
+                      <a:prstDash val="solid"/>
+                    </a:lnR>
+                    <a:lnT cap="flat">
+                      <a:noFill/>
+                    </a:lnT>
+                    <a:lnB w="12700" cap="flat">
+                      <a:solidFill>
+                        <a:schemeClr val="tx1"/>
+                      </a:solidFill>
+                      <a:prstDash val="solid"/>
+                    </a:lnB>
+                    <a:lnTlToBr>
+                      <a:noFill/>
+                    </a:lnTlToBr>
+                    <a:lnBlToTr>
+                      <a:noFill/>
+                    </a:lnBlToTr>
+                    <a:noFill/>
+                  </a:tcPr>
+                </a:tc>
+                <a:tc>
+                  <a:txBody>
+                    <a:bodyPr/>
+                    <a:p>
+                      <a:pPr indent="0" algn="ctr">
+                        <a:lnSpc>
+                          <a:spcPct val="100000"/>
+                        </a:lnSpc>
+                        <a:buNone/>
+                      </a:pPr>
+                      <a:r>
+                        <a:rPr lang="en-US" sz="1800" b="0">
+                          <a:solidFill>
+                            <a:srgbClr val="000000"/>
+                          </a:solidFill>
+                          <a:latin typeface="Calibri" charset="-122"/>
+                        </a:rPr>
+                        <a:t>sigmas = {10, 1, 0.1, 0.01, 0.001}</a:t>
+                      </a:r>
+                      <a:endParaRPr lang="en-US" sz="1800" b="0">
+                        <a:solidFill>
+                          <a:srgbClr val="000000"/>
+                        </a:solidFill>
+                        <a:latin typeface="Calibri" charset="-122"/>
+                      </a:endParaRPr>
+                    </a:p>
+                  </a:txBody>
+                  <a:tcPr marL="12700" marR="12700" marT="12700" vert="horz" anchor="ctr" anchorCtr="0">
+                    <a:lnL w="12700">
+                      <a:solidFill>
+                        <a:schemeClr val="tx1"/>
+                      </a:solidFill>
+                      <a:prstDash val="solid"/>
+                    </a:lnL>
+                    <a:lnR w="12700">
+                      <a:solidFill>
+                        <a:schemeClr val="tx1"/>
+                      </a:solidFill>
+                      <a:prstDash val="solid"/>
+                    </a:lnR>
+                    <a:lnT cap="flat">
+                      <a:noFill/>
+                    </a:lnT>
+                    <a:lnB w="12700" cap="flat">
+                      <a:solidFill>
+                        <a:schemeClr val="tx1"/>
+                      </a:solidFill>
+                      <a:prstDash val="solid"/>
+                    </a:lnB>
+                    <a:lnTlToBr>
+                      <a:noFill/>
+                    </a:lnTlToBr>
+                    <a:lnBlToTr>
+                      <a:noFill/>
+                    </a:lnBlToTr>
+                    <a:noFill/>
+                  </a:tcPr>
+                </a:tc>
+                <a:tc>
+                  <a:txBody>
+                    <a:bodyPr/>
+                    <a:p>
+                      <a:pPr indent="0" algn="ctr">
+                        <a:lnSpc>
+                          <a:spcPct val="100000"/>
+                        </a:lnSpc>
+                        <a:buNone/>
+                      </a:pPr>
+                      <a:r>
+                        <a:rPr lang="en-US" sz="1800" b="0">
+                          <a:solidFill>
+                            <a:srgbClr val="000000"/>
+                          </a:solidFill>
+                          <a:latin typeface="Calibri" charset="-122"/>
+                        </a:rPr>
+                        <a:t>porcents = {10, 1, 0.1, 0.01, 0.001}</a:t>
+                      </a:r>
+                      <a:endParaRPr lang="en-US" sz="1800" b="0">
+                        <a:solidFill>
+                          <a:srgbClr val="000000"/>
+                        </a:solidFill>
+                        <a:latin typeface="Calibri" charset="-122"/>
+                      </a:endParaRPr>
+                    </a:p>
+                  </a:txBody>
+                  <a:tcPr marL="12700" marR="12700" marT="12700" vert="horz" anchor="ctr" anchorCtr="0">
+                    <a:lnL w="12700">
+                      <a:solidFill>
+                        <a:schemeClr val="tx1"/>
+                      </a:solidFill>
+                      <a:prstDash val="solid"/>
+                    </a:lnL>
+                    <a:lnR w="12700">
+                      <a:solidFill>
+                        <a:schemeClr val="tx1"/>
+                      </a:solidFill>
+                      <a:prstDash val="solid"/>
+                    </a:lnR>
+                    <a:lnT cap="flat">
+                      <a:noFill/>
+                    </a:lnT>
+                    <a:lnB w="12700" cap="flat">
+                      <a:solidFill>
+                        <a:schemeClr val="tx1"/>
+                      </a:solidFill>
+                      <a:prstDash val="solid"/>
+                    </a:lnB>
+                    <a:lnTlToBr>
+                      <a:noFill/>
+                    </a:lnTlToBr>
+                    <a:lnBlToTr>
+                      <a:noFill/>
+                    </a:lnBlToTr>
+                    <a:noFill/>
+                  </a:tcPr>
+                </a:tc>
+                <a:tc>
+                  <a:txBody>
+                    <a:bodyPr/>
+                    <a:p>
+                      <a:pPr indent="0" algn="ctr">
+                        <a:lnSpc>
+                          <a:spcPct val="100000"/>
+                        </a:lnSpc>
+                        <a:buNone/>
+                      </a:pPr>
+                      <a:r>
+                        <a:rPr lang="en-US" sz="1800" b="0">
+                          <a:solidFill>
+                            <a:srgbClr val="000000"/>
+                          </a:solidFill>
+                          <a:latin typeface="Calibri" charset="-122"/>
+                        </a:rPr>
+                        <a:t>sigmas = {10, 1, 0.1, 0.01, 0.001}</a:t>
+                      </a:r>
+                      <a:endParaRPr lang="en-US" sz="1800" b="0">
+                        <a:solidFill>
+                          <a:srgbClr val="000000"/>
+                        </a:solidFill>
+                        <a:latin typeface="Calibri" charset="-122"/>
+                      </a:endParaRPr>
+                    </a:p>
+                  </a:txBody>
+                  <a:tcPr marL="12700" marR="12700" marT="12700" vert="horz" anchor="ctr" anchorCtr="0">
+                    <a:lnL w="12700">
+                      <a:solidFill>
+                        <a:schemeClr val="tx1"/>
+                      </a:solidFill>
+                      <a:prstDash val="solid"/>
+                    </a:lnL>
+                    <a:lnR w="12700" cap="flat">
+                      <a:solidFill>
+                        <a:schemeClr val="tx1"/>
+                      </a:solidFill>
+                      <a:prstDash val="solid"/>
+                    </a:lnR>
+                    <a:lnT cap="flat">
+                      <a:noFill/>
+                    </a:lnT>
+                    <a:lnB w="12700" cap="flat">
+                      <a:solidFill>
+                        <a:schemeClr val="tx1"/>
+                      </a:solidFill>
+                      <a:prstDash val="solid"/>
+                    </a:lnB>
+                    <a:lnTlToBr>
+                      <a:noFill/>
+                    </a:lnTlToBr>
+                    <a:lnBlToTr>
+                      <a:noFill/>
+                    </a:lnBlToTr>
+                    <a:noFill/>
+                  </a:tcPr>
+                </a:tc>
+              </a:tr>
+            </a:tbl>
+          </a:graphicData>
+        </a:graphic>
+      </p:graphicFrame>
+      <p:cxnSp>
+        <p:nvCxnSpPr>
+          <p:cNvPr id="7" name="Straight Connector 6"/>
+          <p:cNvCxnSpPr/>
+          <p:nvPr/>
+        </p:nvCxnSpPr>
+        <p:spPr>
+          <a:xfrm>
+            <a:off x="5276850" y="111760"/>
+            <a:ext cx="13970" cy="6591935"/>
+          </a:xfrm>
+          <a:prstGeom prst="line">
+            <a:avLst/>
+          </a:prstGeom>
+          <a:ln w="38100"/>
+        </p:spPr>
+        <p:style>
+          <a:lnRef idx="1">
+            <a:schemeClr val="accent5"/>
+          </a:lnRef>
+          <a:fillRef idx="0">
+            <a:schemeClr val="accent5"/>
+          </a:fillRef>
+          <a:effectRef idx="0">
+            <a:schemeClr val="accent5"/>
+          </a:effectRef>
+          <a:fontRef idx="minor">
+            <a:schemeClr val="tx1"/>
+          </a:fontRef>
+        </p:style>
+      </p:cxnSp>
+      <p:sp>
+        <p:nvSpPr>
+          <p:cNvPr id="10" name="Text Box 9"/>
+          <p:cNvSpPr txBox="1"/>
+          <p:nvPr/>
+        </p:nvSpPr>
+        <p:spPr>
+          <a:xfrm>
+            <a:off x="2827655" y="447675"/>
+            <a:ext cx="1581150" cy="368300"/>
+          </a:xfrm>
+          <a:prstGeom prst="rect">
+            <a:avLst/>
+          </a:prstGeom>
+          <a:noFill/>
+        </p:spPr>
+        <p:txBody>
+          <a:bodyPr wrap="square" rtlCol="0">
+            <a:spAutoFit/>
+            <a:scene3d>
+              <a:camera prst="orthographicFront"/>
+              <a:lightRig rig="threePt" dir="t"/>
+            </a:scene3d>
+          </a:bodyPr>
+          <a:p>
+            <a:pPr algn="ctr"/>
+            <a:r>
+              <a:rPr lang="pt-PT" altLang="en-US" b="1">
+                <a:ln/>
+                <a:solidFill>
+                  <a:srgbClr val="C00000"/>
+                </a:solidFill>
+                <a:effectLst>
+                  <a:outerShdw blurRad="38100" dist="19050" dir="2700000" algn="tl" rotWithShape="0">
+                    <a:schemeClr val="dk1">
+                      <a:alpha val="40000"/>
+                    </a:schemeClr>
+                  </a:outerShdw>
+                </a:effectLst>
+              </a:rPr>
+              <a:t>REAL1</a:t>
+            </a:r>
+            <a:endParaRPr lang="pt-PT" altLang="en-US" b="1">
+              <a:ln/>
+              <a:solidFill>
+                <a:srgbClr val="C00000"/>
+              </a:solidFill>
+              <a:effectLst>
+                <a:outerShdw blurRad="38100" dist="19050" dir="2700000" algn="tl" rotWithShape="0">
+                  <a:schemeClr val="dk1">
+                    <a:alpha val="40000"/>
+                  </a:schemeClr>
+                </a:outerShdw>
+              </a:effectLst>
+            </a:endParaRPr>
+          </a:p>
+        </p:txBody>
+      </p:sp>
+      <p:sp>
+        <p:nvSpPr>
+          <p:cNvPr id="11" name="Text Box 10"/>
+          <p:cNvSpPr txBox="1"/>
+          <p:nvPr/>
+        </p:nvSpPr>
+        <p:spPr>
+          <a:xfrm>
+            <a:off x="7026275" y="391795"/>
+            <a:ext cx="1581150" cy="368300"/>
+          </a:xfrm>
+          <a:prstGeom prst="rect">
+            <a:avLst/>
+          </a:prstGeom>
+          <a:noFill/>
+        </p:spPr>
+        <p:txBody>
+          <a:bodyPr wrap="square" rtlCol="0">
+            <a:spAutoFit/>
+            <a:scene3d>
+              <a:camera prst="orthographicFront"/>
+              <a:lightRig rig="threePt" dir="t"/>
+            </a:scene3d>
+          </a:bodyPr>
+          <a:p>
+            <a:pPr algn="ctr"/>
+            <a:r>
+              <a:rPr lang="pt-PT" altLang="en-US" b="1">
+                <a:solidFill>
+                  <a:srgbClr val="C00000"/>
+                </a:solidFill>
+                <a:effectLst>
+                  <a:outerShdw blurRad="38100" dist="19050" dir="2700000" algn="tl" rotWithShape="0">
+                    <a:schemeClr val="dk1">
+                      <a:alpha val="40000"/>
+                    </a:schemeClr>
+                  </a:outerShdw>
+                </a:effectLst>
+              </a:rPr>
+              <a:t>REAL2</a:t>
+            </a:r>
+            <a:endParaRPr lang="pt-PT" altLang="en-US" b="1">
+              <a:solidFill>
+                <a:srgbClr val="C00000"/>
+              </a:solidFill>
+              <a:effectLst>
+                <a:outerShdw blurRad="38100" dist="19050" dir="2700000" algn="tl" rotWithShape="0">
+                  <a:schemeClr val="dk1">
+                    <a:alpha val="40000"/>
+                  </a:schemeClr>
+                </a:outerShdw>
+              </a:effectLst>
+            </a:endParaRPr>
+          </a:p>
+        </p:txBody>
+      </p:sp>
+    </p:spTree>
+  </p:cSld>
+  <p:clrMapOvr>
+    <a:masterClrMapping/>
+  </p:clrMapOvr>
+</p:sld>
+</file>
+
 <file path=ppt/slides/slide2.xml><?xml version="1.0" encoding="utf-8"?>
 <p:sld xmlns:a="http://schemas.openxmlformats.org/drawingml/2006/main" xmlns:r="http://schemas.openxmlformats.org/officeDocument/2006/relationships" xmlns:p="http://schemas.openxmlformats.org/presentationml/2006/main">
   <p:cSld>

</xml_diff>